<commit_message>
All examples with fixes
</commit_message>
<xml_diff>
--- a/Lab_6/Lab 6.pptx
+++ b/Lab_6/Lab 6.pptx
@@ -244,7 +244,7 @@
           <a:p>
             <a:fld id="{8FA6190C-3C84-46E6-B023-7C78E6248499}" type="datetimeFigureOut">
               <a:rPr lang="en-US" smtClean="0"/>
-              <a:t>10/22/2018</a:t>
+              <a:t>10/24/2018</a:t>
             </a:fld>
             <a:endParaRPr lang="en-US"/>
           </a:p>
@@ -697,7 +697,7 @@
           <a:p>
             <a:fld id="{605CA037-1562-44A1-81D1-2BCF99CE123A}" type="datetimeFigureOut">
               <a:rPr lang="en-US" smtClean="0"/>
-              <a:t>10/22/2018</a:t>
+              <a:t>10/24/2018</a:t>
             </a:fld>
             <a:endParaRPr lang="en-US"/>
           </a:p>
@@ -972,7 +972,7 @@
           <a:p>
             <a:fld id="{605CA037-1562-44A1-81D1-2BCF99CE123A}" type="datetimeFigureOut">
               <a:rPr lang="en-US" smtClean="0"/>
-              <a:t>10/22/2018</a:t>
+              <a:t>10/24/2018</a:t>
             </a:fld>
             <a:endParaRPr lang="en-US"/>
           </a:p>
@@ -1166,7 +1166,7 @@
           <a:p>
             <a:fld id="{605CA037-1562-44A1-81D1-2BCF99CE123A}" type="datetimeFigureOut">
               <a:rPr lang="en-US" smtClean="0"/>
-              <a:t>10/22/2018</a:t>
+              <a:t>10/24/2018</a:t>
             </a:fld>
             <a:endParaRPr lang="en-US"/>
           </a:p>
@@ -1439,7 +1439,7 @@
           <a:p>
             <a:fld id="{605CA037-1562-44A1-81D1-2BCF99CE123A}" type="datetimeFigureOut">
               <a:rPr lang="en-US" smtClean="0"/>
-              <a:t>10/22/2018</a:t>
+              <a:t>10/24/2018</a:t>
             </a:fld>
             <a:endParaRPr lang="en-US"/>
           </a:p>
@@ -1780,7 +1780,7 @@
           <a:p>
             <a:fld id="{605CA037-1562-44A1-81D1-2BCF99CE123A}" type="datetimeFigureOut">
               <a:rPr lang="en-US" smtClean="0"/>
-              <a:t>10/22/2018</a:t>
+              <a:t>10/24/2018</a:t>
             </a:fld>
             <a:endParaRPr lang="en-US"/>
           </a:p>
@@ -2403,7 +2403,7 @@
           <a:p>
             <a:fld id="{605CA037-1562-44A1-81D1-2BCF99CE123A}" type="datetimeFigureOut">
               <a:rPr lang="en-US" smtClean="0"/>
-              <a:t>10/22/2018</a:t>
+              <a:t>10/24/2018</a:t>
             </a:fld>
             <a:endParaRPr lang="en-US"/>
           </a:p>
@@ -3263,7 +3263,7 @@
           <a:p>
             <a:fld id="{605CA037-1562-44A1-81D1-2BCF99CE123A}" type="datetimeFigureOut">
               <a:rPr lang="en-US" smtClean="0"/>
-              <a:t>10/22/2018</a:t>
+              <a:t>10/24/2018</a:t>
             </a:fld>
             <a:endParaRPr lang="en-US"/>
           </a:p>
@@ -3433,7 +3433,7 @@
           <a:p>
             <a:fld id="{605CA037-1562-44A1-81D1-2BCF99CE123A}" type="datetimeFigureOut">
               <a:rPr lang="en-US" smtClean="0"/>
-              <a:t>10/22/2018</a:t>
+              <a:t>10/24/2018</a:t>
             </a:fld>
             <a:endParaRPr lang="en-US"/>
           </a:p>
@@ -3613,7 +3613,7 @@
           <a:p>
             <a:fld id="{605CA037-1562-44A1-81D1-2BCF99CE123A}" type="datetimeFigureOut">
               <a:rPr lang="en-US" smtClean="0"/>
-              <a:t>10/22/2018</a:t>
+              <a:t>10/24/2018</a:t>
             </a:fld>
             <a:endParaRPr lang="en-US"/>
           </a:p>
@@ -3783,7 +3783,7 @@
           <a:p>
             <a:fld id="{605CA037-1562-44A1-81D1-2BCF99CE123A}" type="datetimeFigureOut">
               <a:rPr lang="en-US" smtClean="0"/>
-              <a:t>10/22/2018</a:t>
+              <a:t>10/24/2018</a:t>
             </a:fld>
             <a:endParaRPr lang="en-US"/>
           </a:p>
@@ -4030,7 +4030,7 @@
           <a:p>
             <a:fld id="{605CA037-1562-44A1-81D1-2BCF99CE123A}" type="datetimeFigureOut">
               <a:rPr lang="en-US" smtClean="0"/>
-              <a:t>10/22/2018</a:t>
+              <a:t>10/24/2018</a:t>
             </a:fld>
             <a:endParaRPr lang="en-US"/>
           </a:p>
@@ -4322,7 +4322,7 @@
           <a:p>
             <a:fld id="{605CA037-1562-44A1-81D1-2BCF99CE123A}" type="datetimeFigureOut">
               <a:rPr lang="en-US" smtClean="0"/>
-              <a:t>10/22/2018</a:t>
+              <a:t>10/24/2018</a:t>
             </a:fld>
             <a:endParaRPr lang="en-US"/>
           </a:p>
@@ -4766,7 +4766,7 @@
           <a:p>
             <a:fld id="{605CA037-1562-44A1-81D1-2BCF99CE123A}" type="datetimeFigureOut">
               <a:rPr lang="en-US" smtClean="0"/>
-              <a:t>10/22/2018</a:t>
+              <a:t>10/24/2018</a:t>
             </a:fld>
             <a:endParaRPr lang="en-US"/>
           </a:p>
@@ -4884,7 +4884,7 @@
           <a:p>
             <a:fld id="{605CA037-1562-44A1-81D1-2BCF99CE123A}" type="datetimeFigureOut">
               <a:rPr lang="en-US" smtClean="0"/>
-              <a:t>10/22/2018</a:t>
+              <a:t>10/24/2018</a:t>
             </a:fld>
             <a:endParaRPr lang="en-US"/>
           </a:p>
@@ -4979,7 +4979,7 @@
           <a:p>
             <a:fld id="{605CA037-1562-44A1-81D1-2BCF99CE123A}" type="datetimeFigureOut">
               <a:rPr lang="en-US" smtClean="0"/>
-              <a:t>10/22/2018</a:t>
+              <a:t>10/24/2018</a:t>
             </a:fld>
             <a:endParaRPr lang="en-US"/>
           </a:p>
@@ -5258,7 +5258,7 @@
           <a:p>
             <a:fld id="{605CA037-1562-44A1-81D1-2BCF99CE123A}" type="datetimeFigureOut">
               <a:rPr lang="en-US" smtClean="0"/>
-              <a:t>10/22/2018</a:t>
+              <a:t>10/24/2018</a:t>
             </a:fld>
             <a:endParaRPr lang="en-US"/>
           </a:p>
@@ -5533,7 +5533,7 @@
           <a:p>
             <a:fld id="{605CA037-1562-44A1-81D1-2BCF99CE123A}" type="datetimeFigureOut">
               <a:rPr lang="en-US" smtClean="0"/>
-              <a:t>10/22/2018</a:t>
+              <a:t>10/24/2018</a:t>
             </a:fld>
             <a:endParaRPr lang="en-US"/>
           </a:p>
@@ -5962,7 +5962,7 @@
           <a:p>
             <a:fld id="{605CA037-1562-44A1-81D1-2BCF99CE123A}" type="datetimeFigureOut">
               <a:rPr lang="en-US" smtClean="0"/>
-              <a:t>10/22/2018</a:t>
+              <a:t>10/24/2018</a:t>
             </a:fld>
             <a:endParaRPr lang="en-US"/>
           </a:p>
@@ -9741,7 +9741,7 @@
           <a:p>
             <a:r>
               <a:rPr lang="en-CA" sz="2400" dirty="0"/>
-              <a:t>NEXT DATASET - [4,3,1] </a:t>
+              <a:t>NEXT DATASET - [2,4,1] </a:t>
             </a:r>
           </a:p>
           <a:p>

</xml_diff>